<commit_message>
Replaced Systemout statements with Logger
</commit_message>
<xml_diff>
--- a/Documents/ProtoDebuggerPresentation.pptx
+++ b/Documents/ProtoDebuggerPresentation.pptx
@@ -366,7 +366,7 @@
             <a:fld id="{DADD7335-8523-47AF-84EC-C89F81FE965C}" type="datetimeFigureOut">
               <a:rPr lang="en-US" smtClean="0"/>
               <a:pPr/>
-              <a:t>11/12/2012</a:t>
+              <a:t>11/13/2012</a:t>
             </a:fld>
             <a:endParaRPr lang="en-US"/>
           </a:p>
@@ -591,7 +591,7 @@
             <a:fld id="{DADD7335-8523-47AF-84EC-C89F81FE965C}" type="datetimeFigureOut">
               <a:rPr lang="en-US" smtClean="0"/>
               <a:pPr/>
-              <a:t>11/12/2012</a:t>
+              <a:t>11/13/2012</a:t>
             </a:fld>
             <a:endParaRPr lang="en-US"/>
           </a:p>
@@ -873,7 +873,7 @@
             <a:fld id="{DADD7335-8523-47AF-84EC-C89F81FE965C}" type="datetimeFigureOut">
               <a:rPr lang="en-US" smtClean="0"/>
               <a:pPr/>
-              <a:t>11/12/2012</a:t>
+              <a:t>11/13/2012</a:t>
             </a:fld>
             <a:endParaRPr lang="en-US"/>
           </a:p>
@@ -1054,7 +1054,7 @@
             <a:fld id="{DADD7335-8523-47AF-84EC-C89F81FE965C}" type="datetimeFigureOut">
               <a:rPr lang="en-US" smtClean="0"/>
               <a:pPr/>
-              <a:t>11/12/2012</a:t>
+              <a:t>11/13/2012</a:t>
             </a:fld>
             <a:endParaRPr lang="en-US"/>
           </a:p>
@@ -1414,7 +1414,7 @@
             <a:fld id="{DADD7335-8523-47AF-84EC-C89F81FE965C}" type="datetimeFigureOut">
               <a:rPr lang="en-US" smtClean="0"/>
               <a:pPr/>
-              <a:t>11/12/2012</a:t>
+              <a:t>11/13/2012</a:t>
             </a:fld>
             <a:endParaRPr lang="en-US"/>
           </a:p>
@@ -1703,7 +1703,7 @@
             <a:fld id="{DADD7335-8523-47AF-84EC-C89F81FE965C}" type="datetimeFigureOut">
               <a:rPr lang="en-US" smtClean="0"/>
               <a:pPr/>
-              <a:t>11/12/2012</a:t>
+              <a:t>11/13/2012</a:t>
             </a:fld>
             <a:endParaRPr lang="en-US"/>
           </a:p>
@@ -2127,7 +2127,7 @@
             <a:fld id="{DADD7335-8523-47AF-84EC-C89F81FE965C}" type="datetimeFigureOut">
               <a:rPr lang="en-US" smtClean="0"/>
               <a:pPr/>
-              <a:t>11/12/2012</a:t>
+              <a:t>11/13/2012</a:t>
             </a:fld>
             <a:endParaRPr lang="en-US"/>
           </a:p>
@@ -2244,7 +2244,7 @@
             <a:fld id="{DADD7335-8523-47AF-84EC-C89F81FE965C}" type="datetimeFigureOut">
               <a:rPr lang="en-US" smtClean="0"/>
               <a:pPr/>
-              <a:t>11/12/2012</a:t>
+              <a:t>11/13/2012</a:t>
             </a:fld>
             <a:endParaRPr lang="en-US"/>
           </a:p>
@@ -2336,7 +2336,7 @@
             <a:fld id="{DADD7335-8523-47AF-84EC-C89F81FE965C}" type="datetimeFigureOut">
               <a:rPr lang="en-US" smtClean="0"/>
               <a:pPr/>
-              <a:t>11/12/2012</a:t>
+              <a:t>11/13/2012</a:t>
             </a:fld>
             <a:endParaRPr lang="en-US"/>
           </a:p>
@@ -2616,7 +2616,7 @@
             <a:fld id="{DADD7335-8523-47AF-84EC-C89F81FE965C}" type="datetimeFigureOut">
               <a:rPr lang="en-US" smtClean="0"/>
               <a:pPr/>
-              <a:t>11/12/2012</a:t>
+              <a:t>11/13/2012</a:t>
             </a:fld>
             <a:endParaRPr lang="en-US"/>
           </a:p>
@@ -2984,7 +2984,7 @@
             <a:fld id="{DADD7335-8523-47AF-84EC-C89F81FE965C}" type="datetimeFigureOut">
               <a:rPr lang="en-US" smtClean="0"/>
               <a:pPr/>
-              <a:t>11/12/2012</a:t>
+              <a:t>11/13/2012</a:t>
             </a:fld>
             <a:endParaRPr lang="en-US"/>
           </a:p>
@@ -3423,7 +3423,7 @@
             <a:fld id="{DADD7335-8523-47AF-84EC-C89F81FE965C}" type="datetimeFigureOut">
               <a:rPr lang="en-US" smtClean="0"/>
               <a:pPr/>
-              <a:t>11/12/2012</a:t>
+              <a:t>11/13/2012</a:t>
             </a:fld>
             <a:endParaRPr lang="en-US"/>
           </a:p>
@@ -4228,11 +4228,7 @@
             </a:r>
             <a:r>
               <a:rPr lang="en-US" sz="2200" dirty="0" smtClean="0"/>
-              <a:t> </a:t>
-            </a:r>
-            <a:r>
-              <a:rPr lang="en-US" sz="2200" dirty="0" smtClean="0"/>
-              <a:t>GUI </a:t>
+              <a:t> GUI </a:t>
             </a:r>
             <a:r>
               <a:rPr lang="en-US" sz="2200" dirty="0" err="1" smtClean="0"/>
@@ -5275,11 +5271,7 @@
           <a:p>
             <a:r>
               <a:rPr lang="en-US" dirty="0" smtClean="0"/>
-              <a:t>Lessons </a:t>
-            </a:r>
-            <a:r>
-              <a:rPr lang="en-US" dirty="0" smtClean="0"/>
-              <a:t>Learned And Future Enhancements</a:t>
+              <a:t>Lessons Learned And Future Enhancements</a:t>
             </a:r>
             <a:endParaRPr lang="en-US" dirty="0"/>
           </a:p>

</xml_diff>

<commit_message>
FINAL PRESENTATION CHANGE (from Alian)
</commit_message>
<xml_diff>
--- a/Documents/ProtoDebuggerPresentation.pptx
+++ b/Documents/ProtoDebuggerPresentation.pptx
@@ -209,7 +209,7 @@
             <a:fld id="{767A09BB-24D7-4C65-803B-75F5185601A3}" type="datetimeFigureOut">
               <a:rPr lang="en-US" smtClean="0"/>
               <a:pPr/>
-              <a:t>11/14/2012</a:t>
+              <a:t>11/15/2012</a:t>
             </a:fld>
             <a:endParaRPr lang="en-US"/>
           </a:p>
@@ -372,7 +372,7 @@
             <a:fld id="{8363C6F4-2516-4709-AE6D-9EBACA5F280F}" type="datetimeFigureOut">
               <a:rPr lang="en-US" smtClean="0"/>
               <a:pPr/>
-              <a:t>11/14/2012</a:t>
+              <a:t>11/15/2012</a:t>
             </a:fld>
             <a:endParaRPr lang="en-US"/>
           </a:p>
@@ -888,7 +888,7 @@
             <a:fld id="{DADD7335-8523-47AF-84EC-C89F81FE965C}" type="datetimeFigureOut">
               <a:rPr lang="en-US" smtClean="0"/>
               <a:pPr/>
-              <a:t>11/14/2012</a:t>
+              <a:t>11/15/2012</a:t>
             </a:fld>
             <a:endParaRPr lang="en-US"/>
           </a:p>
@@ -1113,7 +1113,7 @@
             <a:fld id="{DADD7335-8523-47AF-84EC-C89F81FE965C}" type="datetimeFigureOut">
               <a:rPr lang="en-US" smtClean="0"/>
               <a:pPr/>
-              <a:t>11/14/2012</a:t>
+              <a:t>11/15/2012</a:t>
             </a:fld>
             <a:endParaRPr lang="en-US"/>
           </a:p>
@@ -1395,7 +1395,7 @@
             <a:fld id="{DADD7335-8523-47AF-84EC-C89F81FE965C}" type="datetimeFigureOut">
               <a:rPr lang="en-US" smtClean="0"/>
               <a:pPr/>
-              <a:t>11/14/2012</a:t>
+              <a:t>11/15/2012</a:t>
             </a:fld>
             <a:endParaRPr lang="en-US"/>
           </a:p>
@@ -1576,7 +1576,7 @@
             <a:fld id="{DADD7335-8523-47AF-84EC-C89F81FE965C}" type="datetimeFigureOut">
               <a:rPr lang="en-US" smtClean="0"/>
               <a:pPr/>
-              <a:t>11/14/2012</a:t>
+              <a:t>11/15/2012</a:t>
             </a:fld>
             <a:endParaRPr lang="en-US"/>
           </a:p>
@@ -1936,7 +1936,7 @@
             <a:fld id="{DADD7335-8523-47AF-84EC-C89F81FE965C}" type="datetimeFigureOut">
               <a:rPr lang="en-US" smtClean="0"/>
               <a:pPr/>
-              <a:t>11/14/2012</a:t>
+              <a:t>11/15/2012</a:t>
             </a:fld>
             <a:endParaRPr lang="en-US"/>
           </a:p>
@@ -2225,7 +2225,7 @@
             <a:fld id="{DADD7335-8523-47AF-84EC-C89F81FE965C}" type="datetimeFigureOut">
               <a:rPr lang="en-US" smtClean="0"/>
               <a:pPr/>
-              <a:t>11/14/2012</a:t>
+              <a:t>11/15/2012</a:t>
             </a:fld>
             <a:endParaRPr lang="en-US"/>
           </a:p>
@@ -2649,7 +2649,7 @@
             <a:fld id="{DADD7335-8523-47AF-84EC-C89F81FE965C}" type="datetimeFigureOut">
               <a:rPr lang="en-US" smtClean="0"/>
               <a:pPr/>
-              <a:t>11/14/2012</a:t>
+              <a:t>11/15/2012</a:t>
             </a:fld>
             <a:endParaRPr lang="en-US"/>
           </a:p>
@@ -2766,7 +2766,7 @@
             <a:fld id="{DADD7335-8523-47AF-84EC-C89F81FE965C}" type="datetimeFigureOut">
               <a:rPr lang="en-US" smtClean="0"/>
               <a:pPr/>
-              <a:t>11/14/2012</a:t>
+              <a:t>11/15/2012</a:t>
             </a:fld>
             <a:endParaRPr lang="en-US"/>
           </a:p>
@@ -2858,7 +2858,7 @@
             <a:fld id="{DADD7335-8523-47AF-84EC-C89F81FE965C}" type="datetimeFigureOut">
               <a:rPr lang="en-US" smtClean="0"/>
               <a:pPr/>
-              <a:t>11/14/2012</a:t>
+              <a:t>11/15/2012</a:t>
             </a:fld>
             <a:endParaRPr lang="en-US"/>
           </a:p>
@@ -3138,7 +3138,7 @@
             <a:fld id="{DADD7335-8523-47AF-84EC-C89F81FE965C}" type="datetimeFigureOut">
               <a:rPr lang="en-US" smtClean="0"/>
               <a:pPr/>
-              <a:t>11/14/2012</a:t>
+              <a:t>11/15/2012</a:t>
             </a:fld>
             <a:endParaRPr lang="en-US"/>
           </a:p>
@@ -3506,7 +3506,7 @@
             <a:fld id="{DADD7335-8523-47AF-84EC-C89F81FE965C}" type="datetimeFigureOut">
               <a:rPr lang="en-US" smtClean="0"/>
               <a:pPr/>
-              <a:t>11/14/2012</a:t>
+              <a:t>11/15/2012</a:t>
             </a:fld>
             <a:endParaRPr lang="en-US"/>
           </a:p>
@@ -3985,7 +3985,7 @@
             <a:fld id="{DADD7335-8523-47AF-84EC-C89F81FE965C}" type="datetimeFigureOut">
               <a:rPr lang="en-US" smtClean="0"/>
               <a:pPr/>
-              <a:t>11/14/2012</a:t>
+              <a:t>11/15/2012</a:t>
             </a:fld>
             <a:endParaRPr lang="en-US"/>
           </a:p>
@@ -4628,11 +4628,7 @@
           <a:p>
             <a:r>
               <a:rPr lang="en-US" dirty="0" smtClean="0"/>
-              <a:t>Lessons </a:t>
-            </a:r>
-            <a:r>
-              <a:rPr lang="en-US" dirty="0" smtClean="0"/>
-              <a:t>Learned</a:t>
+              <a:t>Lessons Learned</a:t>
             </a:r>
             <a:endParaRPr lang="en-US" dirty="0"/>
           </a:p>
@@ -4655,22 +4651,21 @@
           <a:p>
             <a:r>
               <a:rPr lang="en-US" dirty="0" smtClean="0"/>
-              <a:t>Google </a:t>
-            </a:r>
+              <a:t>Google developed Protocol Buffers differently in C++ than Java</a:t>
+            </a:r>
+          </a:p>
+          <a:p>
+            <a:pPr lvl="1"/>
             <a:r>
               <a:rPr lang="en-US" dirty="0" smtClean="0"/>
-              <a:t>developed Protocol Buffers differently in C++ than </a:t>
-            </a:r>
+              <a:t>Differences in the C++ and Java API</a:t>
+            </a:r>
+          </a:p>
+          <a:p>
+            <a:pPr lvl="1"/>
             <a:r>
               <a:rPr lang="en-US" dirty="0" smtClean="0"/>
-              <a:t>Java</a:t>
-            </a:r>
-          </a:p>
-          <a:p>
-            <a:pPr lvl="1"/>
-            <a:r>
-              <a:rPr lang="en-US" dirty="0" smtClean="0"/>
-              <a:t>No Builder class in C++ for constructing messages</a:t>
+              <a:t>Abstraction of messages is handle differently</a:t>
             </a:r>
             <a:endParaRPr lang="en-US" dirty="0" smtClean="0"/>
           </a:p>
@@ -4683,24 +4678,20 @@
               <a:rPr lang="en-US" dirty="0" smtClean="0"/>
               <a:t>RCP</a:t>
             </a:r>
-          </a:p>
-          <a:p>
-            <a:pPr lvl="1"/>
+            <a:r>
+              <a:rPr lang="en-US" dirty="0"/>
+              <a:t> </a:t>
+            </a:r>
             <a:r>
               <a:rPr lang="en-US" dirty="0" smtClean="0"/>
-              <a:t>The look and feel of QT Widgets different from RCP</a:t>
-            </a:r>
-          </a:p>
-          <a:p>
-            <a:pPr lvl="1"/>
-            <a:r>
-              <a:rPr lang="en-US" dirty="0" smtClean="0"/>
-              <a:t>Would need to create a different application than have a IDE plug-in environment</a:t>
-            </a:r>
-          </a:p>
-          <a:p>
-            <a:pPr lvl="1"/>
-            <a:endParaRPr lang="en-US" dirty="0"/>
+              <a:t>would require a learning curve</a:t>
+            </a:r>
+          </a:p>
+          <a:p>
+            <a:pPr lvl="1">
+              <a:buNone/>
+            </a:pPr>
+            <a:endParaRPr lang="en-US" dirty="0" smtClean="0"/>
           </a:p>
         </p:txBody>
       </p:sp>
@@ -4788,11 +4779,7 @@
           <a:p>
             <a:r>
               <a:rPr lang="en-US" dirty="0" smtClean="0"/>
-              <a:t>Dynamic </a:t>
-            </a:r>
-            <a:r>
-              <a:rPr lang="en-US" dirty="0" smtClean="0"/>
-              <a:t>initialization of </a:t>
+              <a:t>Dynamic initialization of </a:t>
             </a:r>
             <a:r>
               <a:rPr lang="en-US" dirty="0" err="1" smtClean="0"/>
@@ -6295,11 +6282,7 @@
             </a:r>
             <a:r>
               <a:rPr lang="en-US" dirty="0" smtClean="0"/>
-              <a:t> </a:t>
-            </a:r>
-            <a:r>
-              <a:rPr lang="en-US" dirty="0" smtClean="0"/>
-              <a:t>Design Cont.</a:t>
+              <a:t> Design Cont.</a:t>
             </a:r>
             <a:endParaRPr lang="en-US" dirty="0"/>
           </a:p>

</xml_diff>